<commit_message>
added King h+cpp, Game h+cpp
</commit_message>
<xml_diff>
--- a/UML.pptx
+++ b/UML.pptx
@@ -243,7 +243,7 @@
           <a:p>
             <a:fld id="{C1866500-7C78-4941-9E66-777EB300206F}" type="datetimeFigureOut">
               <a:rPr lang="he-IL" smtClean="0"/>
-              <a:t>כ'/כסלו/תש"פ</a:t>
+              <a:t>כ"ו/כסלו/תש"פ</a:t>
             </a:fld>
             <a:endParaRPr lang="he-IL"/>
           </a:p>
@@ -413,7 +413,7 @@
           <a:p>
             <a:fld id="{C1866500-7C78-4941-9E66-777EB300206F}" type="datetimeFigureOut">
               <a:rPr lang="he-IL" smtClean="0"/>
-              <a:t>כ'/כסלו/תש"פ</a:t>
+              <a:t>כ"ו/כסלו/תש"פ</a:t>
             </a:fld>
             <a:endParaRPr lang="he-IL"/>
           </a:p>
@@ -593,7 +593,7 @@
           <a:p>
             <a:fld id="{C1866500-7C78-4941-9E66-777EB300206F}" type="datetimeFigureOut">
               <a:rPr lang="he-IL" smtClean="0"/>
-              <a:t>כ'/כסלו/תש"פ</a:t>
+              <a:t>כ"ו/כסלו/תש"פ</a:t>
             </a:fld>
             <a:endParaRPr lang="he-IL"/>
           </a:p>
@@ -763,7 +763,7 @@
           <a:p>
             <a:fld id="{C1866500-7C78-4941-9E66-777EB300206F}" type="datetimeFigureOut">
               <a:rPr lang="he-IL" smtClean="0"/>
-              <a:t>כ'/כסלו/תש"פ</a:t>
+              <a:t>כ"ו/כסלו/תש"פ</a:t>
             </a:fld>
             <a:endParaRPr lang="he-IL"/>
           </a:p>
@@ -1007,7 +1007,7 @@
           <a:p>
             <a:fld id="{C1866500-7C78-4941-9E66-777EB300206F}" type="datetimeFigureOut">
               <a:rPr lang="he-IL" smtClean="0"/>
-              <a:t>כ'/כסלו/תש"פ</a:t>
+              <a:t>כ"ו/כסלו/תש"פ</a:t>
             </a:fld>
             <a:endParaRPr lang="he-IL"/>
           </a:p>
@@ -1239,7 +1239,7 @@
           <a:p>
             <a:fld id="{C1866500-7C78-4941-9E66-777EB300206F}" type="datetimeFigureOut">
               <a:rPr lang="he-IL" smtClean="0"/>
-              <a:t>כ'/כסלו/תש"פ</a:t>
+              <a:t>כ"ו/כסלו/תש"פ</a:t>
             </a:fld>
             <a:endParaRPr lang="he-IL"/>
           </a:p>
@@ -1606,7 +1606,7 @@
           <a:p>
             <a:fld id="{C1866500-7C78-4941-9E66-777EB300206F}" type="datetimeFigureOut">
               <a:rPr lang="he-IL" smtClean="0"/>
-              <a:t>כ'/כסלו/תש"פ</a:t>
+              <a:t>כ"ו/כסלו/תש"פ</a:t>
             </a:fld>
             <a:endParaRPr lang="he-IL"/>
           </a:p>
@@ -1724,7 +1724,7 @@
           <a:p>
             <a:fld id="{C1866500-7C78-4941-9E66-777EB300206F}" type="datetimeFigureOut">
               <a:rPr lang="he-IL" smtClean="0"/>
-              <a:t>כ'/כסלו/תש"פ</a:t>
+              <a:t>כ"ו/כסלו/תש"פ</a:t>
             </a:fld>
             <a:endParaRPr lang="he-IL"/>
           </a:p>
@@ -1819,7 +1819,7 @@
           <a:p>
             <a:fld id="{C1866500-7C78-4941-9E66-777EB300206F}" type="datetimeFigureOut">
               <a:rPr lang="he-IL" smtClean="0"/>
-              <a:t>כ'/כסלו/תש"פ</a:t>
+              <a:t>כ"ו/כסלו/תש"פ</a:t>
             </a:fld>
             <a:endParaRPr lang="he-IL"/>
           </a:p>
@@ -2096,7 +2096,7 @@
           <a:p>
             <a:fld id="{C1866500-7C78-4941-9E66-777EB300206F}" type="datetimeFigureOut">
               <a:rPr lang="he-IL" smtClean="0"/>
-              <a:t>כ'/כסלו/תש"פ</a:t>
+              <a:t>כ"ו/כסלו/תש"פ</a:t>
             </a:fld>
             <a:endParaRPr lang="he-IL"/>
           </a:p>
@@ -2353,7 +2353,7 @@
           <a:p>
             <a:fld id="{C1866500-7C78-4941-9E66-777EB300206F}" type="datetimeFigureOut">
               <a:rPr lang="he-IL" smtClean="0"/>
-              <a:t>כ'/כסלו/תש"פ</a:t>
+              <a:t>כ"ו/כסלו/תש"פ</a:t>
             </a:fld>
             <a:endParaRPr lang="he-IL"/>
           </a:p>
@@ -2566,7 +2566,7 @@
           <a:p>
             <a:fld id="{C1866500-7C78-4941-9E66-777EB300206F}" type="datetimeFigureOut">
               <a:rPr lang="he-IL" smtClean="0"/>
-              <a:t>כ'/כסלו/תש"פ</a:t>
+              <a:t>כ"ו/כסלו/תש"פ</a:t>
             </a:fld>
             <a:endParaRPr lang="he-IL"/>
           </a:p>
@@ -3128,11 +3128,7 @@
                       <a:pPr algn="l" rtl="0"/>
                       <a:r>
                         <a:rPr lang="en-US" sz="400" baseline="0" dirty="0" smtClean="0"/>
-                        <a:t>+ ~Piece</a:t>
-                      </a:r>
-                      <a:r>
-                        <a:rPr lang="en-US" sz="400" baseline="0" dirty="0" smtClean="0"/>
-                        <a:t>()</a:t>
+                        <a:t>+ ~Piece()</a:t>
                       </a:r>
                     </a:p>
                     <a:p>
@@ -3167,11 +3163,7 @@
                       <a:pPr algn="l" rtl="0"/>
                       <a:r>
                         <a:rPr lang="en-US" sz="400" baseline="0" dirty="0" smtClean="0"/>
-                        <a:t>+ </a:t>
-                      </a:r>
-                      <a:r>
-                        <a:rPr lang="en-US" sz="400" baseline="0" dirty="0" smtClean="0"/>
-                        <a:t>const getType() : string</a:t>
+                        <a:t>+ const getType() : string</a:t>
                       </a:r>
                     </a:p>
                     <a:p>
@@ -4932,7 +4924,7 @@
           <p:nvPr>
             <p:extLst>
               <p:ext uri="{D42A27DB-BD31-4B8C-83A1-F6EECF244321}">
-                <p14:modId xmlns:p14="http://schemas.microsoft.com/office/powerpoint/2010/main" val="1561930223"/>
+                <p14:modId xmlns:p14="http://schemas.microsoft.com/office/powerpoint/2010/main" val="2150420346"/>
               </p:ext>
             </p:extLst>
           </p:nvPr>
@@ -5084,11 +5076,19 @@
                       <a:pPr algn="l" rtl="0"/>
                       <a:r>
                         <a:rPr lang="en-US" sz="400" dirty="0" smtClean="0"/>
-                        <a:t>+ const </a:t>
+                        <a:t>+ </a:t>
                       </a:r>
                       <a:r>
                         <a:rPr lang="en-US" sz="400" dirty="0" err="1" smtClean="0"/>
-                        <a:t>startGame</a:t>
+                        <a:t>const</a:t>
+                      </a:r>
+                      <a:r>
+                        <a:rPr lang="en-US" sz="400" dirty="0" smtClean="0"/>
+                        <a:t> </a:t>
+                      </a:r>
+                      <a:r>
+                        <a:rPr lang="en-US" sz="400" dirty="0" err="1" smtClean="0"/>
+                        <a:t>manageGame</a:t>
                       </a:r>
                       <a:r>
                         <a:rPr lang="en-US" sz="400" dirty="0" smtClean="0"/>

</xml_diff>

<commit_message>
Revert "added King h+cpp, Game h+cpp"
This reverts commit dd35dc50d31ea1c2e21e6ccaac922b5020fc2b82.
</commit_message>
<xml_diff>
--- a/UML.pptx
+++ b/UML.pptx
@@ -243,7 +243,7 @@
           <a:p>
             <a:fld id="{C1866500-7C78-4941-9E66-777EB300206F}" type="datetimeFigureOut">
               <a:rPr lang="he-IL" smtClean="0"/>
-              <a:t>כ"ו/כסלו/תש"פ</a:t>
+              <a:t>כ'/כסלו/תש"פ</a:t>
             </a:fld>
             <a:endParaRPr lang="he-IL"/>
           </a:p>
@@ -413,7 +413,7 @@
           <a:p>
             <a:fld id="{C1866500-7C78-4941-9E66-777EB300206F}" type="datetimeFigureOut">
               <a:rPr lang="he-IL" smtClean="0"/>
-              <a:t>כ"ו/כסלו/תש"פ</a:t>
+              <a:t>כ'/כסלו/תש"פ</a:t>
             </a:fld>
             <a:endParaRPr lang="he-IL"/>
           </a:p>
@@ -593,7 +593,7 @@
           <a:p>
             <a:fld id="{C1866500-7C78-4941-9E66-777EB300206F}" type="datetimeFigureOut">
               <a:rPr lang="he-IL" smtClean="0"/>
-              <a:t>כ"ו/כסלו/תש"פ</a:t>
+              <a:t>כ'/כסלו/תש"פ</a:t>
             </a:fld>
             <a:endParaRPr lang="he-IL"/>
           </a:p>
@@ -763,7 +763,7 @@
           <a:p>
             <a:fld id="{C1866500-7C78-4941-9E66-777EB300206F}" type="datetimeFigureOut">
               <a:rPr lang="he-IL" smtClean="0"/>
-              <a:t>כ"ו/כסלו/תש"פ</a:t>
+              <a:t>כ'/כסלו/תש"פ</a:t>
             </a:fld>
             <a:endParaRPr lang="he-IL"/>
           </a:p>
@@ -1007,7 +1007,7 @@
           <a:p>
             <a:fld id="{C1866500-7C78-4941-9E66-777EB300206F}" type="datetimeFigureOut">
               <a:rPr lang="he-IL" smtClean="0"/>
-              <a:t>כ"ו/כסלו/תש"פ</a:t>
+              <a:t>כ'/כסלו/תש"פ</a:t>
             </a:fld>
             <a:endParaRPr lang="he-IL"/>
           </a:p>
@@ -1239,7 +1239,7 @@
           <a:p>
             <a:fld id="{C1866500-7C78-4941-9E66-777EB300206F}" type="datetimeFigureOut">
               <a:rPr lang="he-IL" smtClean="0"/>
-              <a:t>כ"ו/כסלו/תש"פ</a:t>
+              <a:t>כ'/כסלו/תש"פ</a:t>
             </a:fld>
             <a:endParaRPr lang="he-IL"/>
           </a:p>
@@ -1606,7 +1606,7 @@
           <a:p>
             <a:fld id="{C1866500-7C78-4941-9E66-777EB300206F}" type="datetimeFigureOut">
               <a:rPr lang="he-IL" smtClean="0"/>
-              <a:t>כ"ו/כסלו/תש"פ</a:t>
+              <a:t>כ'/כסלו/תש"פ</a:t>
             </a:fld>
             <a:endParaRPr lang="he-IL"/>
           </a:p>
@@ -1724,7 +1724,7 @@
           <a:p>
             <a:fld id="{C1866500-7C78-4941-9E66-777EB300206F}" type="datetimeFigureOut">
               <a:rPr lang="he-IL" smtClean="0"/>
-              <a:t>כ"ו/כסלו/תש"פ</a:t>
+              <a:t>כ'/כסלו/תש"פ</a:t>
             </a:fld>
             <a:endParaRPr lang="he-IL"/>
           </a:p>
@@ -1819,7 +1819,7 @@
           <a:p>
             <a:fld id="{C1866500-7C78-4941-9E66-777EB300206F}" type="datetimeFigureOut">
               <a:rPr lang="he-IL" smtClean="0"/>
-              <a:t>כ"ו/כסלו/תש"פ</a:t>
+              <a:t>כ'/כסלו/תש"פ</a:t>
             </a:fld>
             <a:endParaRPr lang="he-IL"/>
           </a:p>
@@ -2096,7 +2096,7 @@
           <a:p>
             <a:fld id="{C1866500-7C78-4941-9E66-777EB300206F}" type="datetimeFigureOut">
               <a:rPr lang="he-IL" smtClean="0"/>
-              <a:t>כ"ו/כסלו/תש"פ</a:t>
+              <a:t>כ'/כסלו/תש"פ</a:t>
             </a:fld>
             <a:endParaRPr lang="he-IL"/>
           </a:p>
@@ -2353,7 +2353,7 @@
           <a:p>
             <a:fld id="{C1866500-7C78-4941-9E66-777EB300206F}" type="datetimeFigureOut">
               <a:rPr lang="he-IL" smtClean="0"/>
-              <a:t>כ"ו/כסלו/תש"פ</a:t>
+              <a:t>כ'/כסלו/תש"פ</a:t>
             </a:fld>
             <a:endParaRPr lang="he-IL"/>
           </a:p>
@@ -2566,7 +2566,7 @@
           <a:p>
             <a:fld id="{C1866500-7C78-4941-9E66-777EB300206F}" type="datetimeFigureOut">
               <a:rPr lang="he-IL" smtClean="0"/>
-              <a:t>כ"ו/כסלו/תש"פ</a:t>
+              <a:t>כ'/כסלו/תש"פ</a:t>
             </a:fld>
             <a:endParaRPr lang="he-IL"/>
           </a:p>
@@ -3128,7 +3128,11 @@
                       <a:pPr algn="l" rtl="0"/>
                       <a:r>
                         <a:rPr lang="en-US" sz="400" baseline="0" dirty="0" smtClean="0"/>
-                        <a:t>+ ~Piece()</a:t>
+                        <a:t>+ ~Piece</a:t>
+                      </a:r>
+                      <a:r>
+                        <a:rPr lang="en-US" sz="400" baseline="0" dirty="0" smtClean="0"/>
+                        <a:t>()</a:t>
                       </a:r>
                     </a:p>
                     <a:p>
@@ -3163,7 +3167,11 @@
                       <a:pPr algn="l" rtl="0"/>
                       <a:r>
                         <a:rPr lang="en-US" sz="400" baseline="0" dirty="0" smtClean="0"/>
-                        <a:t>+ const getType() : string</a:t>
+                        <a:t>+ </a:t>
+                      </a:r>
+                      <a:r>
+                        <a:rPr lang="en-US" sz="400" baseline="0" dirty="0" smtClean="0"/>
+                        <a:t>const getType() : string</a:t>
                       </a:r>
                     </a:p>
                     <a:p>
@@ -4924,7 +4932,7 @@
           <p:nvPr>
             <p:extLst>
               <p:ext uri="{D42A27DB-BD31-4B8C-83A1-F6EECF244321}">
-                <p14:modId xmlns:p14="http://schemas.microsoft.com/office/powerpoint/2010/main" val="2150420346"/>
+                <p14:modId xmlns:p14="http://schemas.microsoft.com/office/powerpoint/2010/main" val="1561930223"/>
               </p:ext>
             </p:extLst>
           </p:nvPr>
@@ -5076,19 +5084,11 @@
                       <a:pPr algn="l" rtl="0"/>
                       <a:r>
                         <a:rPr lang="en-US" sz="400" dirty="0" smtClean="0"/>
-                        <a:t>+ </a:t>
+                        <a:t>+ const </a:t>
                       </a:r>
                       <a:r>
                         <a:rPr lang="en-US" sz="400" dirty="0" err="1" smtClean="0"/>
-                        <a:t>const</a:t>
-                      </a:r>
-                      <a:r>
-                        <a:rPr lang="en-US" sz="400" dirty="0" smtClean="0"/>
-                        <a:t> </a:t>
-                      </a:r>
-                      <a:r>
-                        <a:rPr lang="en-US" sz="400" dirty="0" err="1" smtClean="0"/>
-                        <a:t>manageGame</a:t>
+                        <a:t>startGame</a:t>
                       </a:r>
                       <a:r>
                         <a:rPr lang="en-US" sz="400" dirty="0" smtClean="0"/>

</xml_diff>